<commit_message>
FEND - Finaliza projeto
</commit_message>
<xml_diff>
--- a/apresentacao.pptx
+++ b/apresentacao.pptx
@@ -810,7 +810,7 @@
   <p:cSld>
     <p:spTree>
       <p:nvGrpSpPr>
-        <p:cNvPr id="144" name="Shape 144"/>
+        <p:cNvPr id="146" name="Shape 146"/>
         <p:cNvGrpSpPr/>
         <p:nvPr/>
       </p:nvGrpSpPr>
@@ -824,7 +824,7 @@
       </p:grpSpPr>
       <p:sp>
         <p:nvSpPr>
-          <p:cNvPr id="145" name="Google Shape;145;gd9046d09e4_0_2206:notes"/>
+          <p:cNvPr id="147" name="Google Shape;147;gd9046d09e4_0_2206:notes"/>
           <p:cNvSpPr/>
           <p:nvPr>
             <p:ph idx="2" type="sldImg"/>
@@ -859,7 +859,7 @@
       </p:sp>
       <p:sp>
         <p:nvSpPr>
-          <p:cNvPr id="146" name="Google Shape;146;gd9046d09e4_0_2206:notes"/>
+          <p:cNvPr id="148" name="Google Shape;148;gd9046d09e4_0_2206:notes"/>
           <p:cNvSpPr txBox="1"/>
           <p:nvPr>
             <p:ph idx="1" type="body"/>
@@ -909,7 +909,7 @@
   <p:cSld>
     <p:spTree>
       <p:nvGrpSpPr>
-        <p:cNvPr id="152" name="Shape 152"/>
+        <p:cNvPr id="153" name="Shape 153"/>
         <p:cNvGrpSpPr/>
         <p:nvPr/>
       </p:nvGrpSpPr>
@@ -923,7 +923,7 @@
       </p:grpSpPr>
       <p:sp>
         <p:nvSpPr>
-          <p:cNvPr id="153" name="Google Shape;153;gd9046d09e4_0_2214:notes"/>
+          <p:cNvPr id="154" name="Google Shape;154;gd9046d09e4_0_2214:notes"/>
           <p:cNvSpPr/>
           <p:nvPr>
             <p:ph idx="2" type="sldImg"/>
@@ -958,7 +958,7 @@
       </p:sp>
       <p:sp>
         <p:nvSpPr>
-          <p:cNvPr id="154" name="Google Shape;154;gd9046d09e4_0_2214:notes"/>
+          <p:cNvPr id="155" name="Google Shape;155;gd9046d09e4_0_2214:notes"/>
           <p:cNvSpPr txBox="1"/>
           <p:nvPr>
             <p:ph idx="1" type="body"/>
@@ -1404,7 +1404,7 @@
   <p:cSld>
     <p:spTree>
       <p:nvGrpSpPr>
-        <p:cNvPr id="104" name="Shape 104"/>
+        <p:cNvPr id="105" name="Shape 105"/>
         <p:cNvGrpSpPr/>
         <p:nvPr/>
       </p:nvGrpSpPr>
@@ -1418,7 +1418,7 @@
       </p:grpSpPr>
       <p:sp>
         <p:nvSpPr>
-          <p:cNvPr id="105" name="Google Shape;105;gd9046d09e4_0_2118:notes"/>
+          <p:cNvPr id="106" name="Google Shape;106;gd9046d09e4_0_2118:notes"/>
           <p:cNvSpPr/>
           <p:nvPr>
             <p:ph idx="2" type="sldImg"/>
@@ -1453,7 +1453,7 @@
       </p:sp>
       <p:sp>
         <p:nvSpPr>
-          <p:cNvPr id="106" name="Google Shape;106;gd9046d09e4_0_2118:notes"/>
+          <p:cNvPr id="107" name="Google Shape;107;gd9046d09e4_0_2118:notes"/>
           <p:cNvSpPr txBox="1"/>
           <p:nvPr>
             <p:ph idx="1" type="body"/>
@@ -1503,7 +1503,7 @@
   <p:cSld>
     <p:spTree>
       <p:nvGrpSpPr>
-        <p:cNvPr id="112" name="Shape 112"/>
+        <p:cNvPr id="115" name="Shape 115"/>
         <p:cNvGrpSpPr/>
         <p:nvPr/>
       </p:nvGrpSpPr>
@@ -1517,7 +1517,7 @@
       </p:grpSpPr>
       <p:sp>
         <p:nvSpPr>
-          <p:cNvPr id="113" name="Google Shape;113;gd9046d09e4_0_2174:notes"/>
+          <p:cNvPr id="116" name="Google Shape;116;gd9046d09e4_0_2174:notes"/>
           <p:cNvSpPr/>
           <p:nvPr>
             <p:ph idx="2" type="sldImg"/>
@@ -1552,7 +1552,7 @@
       </p:sp>
       <p:sp>
         <p:nvSpPr>
-          <p:cNvPr id="114" name="Google Shape;114;gd9046d09e4_0_2174:notes"/>
+          <p:cNvPr id="117" name="Google Shape;117;gd9046d09e4_0_2174:notes"/>
           <p:cNvSpPr txBox="1"/>
           <p:nvPr>
             <p:ph idx="1" type="body"/>
@@ -1602,7 +1602,7 @@
   <p:cSld>
     <p:spTree>
       <p:nvGrpSpPr>
-        <p:cNvPr id="120" name="Shape 120"/>
+        <p:cNvPr id="125" name="Shape 125"/>
         <p:cNvGrpSpPr/>
         <p:nvPr/>
       </p:nvGrpSpPr>
@@ -1616,7 +1616,7 @@
       </p:grpSpPr>
       <p:sp>
         <p:nvSpPr>
-          <p:cNvPr id="121" name="Google Shape;121;gd9046d09e4_0_2182:notes"/>
+          <p:cNvPr id="126" name="Google Shape;126;gd9046d09e4_0_2182:notes"/>
           <p:cNvSpPr/>
           <p:nvPr>
             <p:ph idx="2" type="sldImg"/>
@@ -1651,7 +1651,7 @@
       </p:sp>
       <p:sp>
         <p:nvSpPr>
-          <p:cNvPr id="122" name="Google Shape;122;gd9046d09e4_0_2182:notes"/>
+          <p:cNvPr id="127" name="Google Shape;127;gd9046d09e4_0_2182:notes"/>
           <p:cNvSpPr txBox="1"/>
           <p:nvPr>
             <p:ph idx="1" type="body"/>
@@ -1701,7 +1701,7 @@
   <p:cSld>
     <p:spTree>
       <p:nvGrpSpPr>
-        <p:cNvPr id="128" name="Shape 128"/>
+        <p:cNvPr id="132" name="Shape 132"/>
         <p:cNvGrpSpPr/>
         <p:nvPr/>
       </p:nvGrpSpPr>
@@ -1715,7 +1715,7 @@
       </p:grpSpPr>
       <p:sp>
         <p:nvSpPr>
-          <p:cNvPr id="129" name="Google Shape;129;gd9046d09e4_0_2190:notes"/>
+          <p:cNvPr id="133" name="Google Shape;133;gd9046d09e4_0_2190:notes"/>
           <p:cNvSpPr/>
           <p:nvPr>
             <p:ph idx="2" type="sldImg"/>
@@ -1750,7 +1750,7 @@
       </p:sp>
       <p:sp>
         <p:nvSpPr>
-          <p:cNvPr id="130" name="Google Shape;130;gd9046d09e4_0_2190:notes"/>
+          <p:cNvPr id="134" name="Google Shape;134;gd9046d09e4_0_2190:notes"/>
           <p:cNvSpPr txBox="1"/>
           <p:nvPr>
             <p:ph idx="1" type="body"/>
@@ -1800,7 +1800,7 @@
   <p:cSld>
     <p:spTree>
       <p:nvGrpSpPr>
-        <p:cNvPr id="136" name="Shape 136"/>
+        <p:cNvPr id="139" name="Shape 139"/>
         <p:cNvGrpSpPr/>
         <p:nvPr/>
       </p:nvGrpSpPr>
@@ -1814,7 +1814,7 @@
       </p:grpSpPr>
       <p:sp>
         <p:nvSpPr>
-          <p:cNvPr id="137" name="Google Shape;137;gd9046d09e4_0_2198:notes"/>
+          <p:cNvPr id="140" name="Google Shape;140;gd9046d09e4_0_2198:notes"/>
           <p:cNvSpPr/>
           <p:nvPr>
             <p:ph idx="2" type="sldImg"/>
@@ -1849,7 +1849,7 @@
       </p:sp>
       <p:sp>
         <p:nvSpPr>
-          <p:cNvPr id="138" name="Google Shape;138;gd9046d09e4_0_2198:notes"/>
+          <p:cNvPr id="141" name="Google Shape;141;gd9046d09e4_0_2198:notes"/>
           <p:cNvSpPr txBox="1"/>
           <p:nvPr>
             <p:ph idx="1" type="body"/>
@@ -4409,7 +4409,7 @@
           </a:prstGeom>
         </p:spPr>
         <p:txBody>
-          <a:bodyPr anchorCtr="0" anchor="t" bIns="91425" lIns="91425" spcFirstLastPara="1" rIns="91425" wrap="square" tIns="91425">
+          <a:bodyPr anchorCtr="0" anchor="ctr" bIns="91425" lIns="91425" spcFirstLastPara="1" rIns="91425" wrap="square" tIns="91425">
             <a:normAutofit/>
           </a:bodyPr>
           <a:lstStyle>
@@ -8207,7 +8207,7 @@
   <p:cSld>
     <p:spTree>
       <p:nvGrpSpPr>
-        <p:cNvPr id="147" name="Shape 147"/>
+        <p:cNvPr id="149" name="Shape 149"/>
         <p:cNvGrpSpPr/>
         <p:nvPr/>
       </p:nvGrpSpPr>
@@ -8221,7 +8221,7 @@
       </p:grpSpPr>
       <p:sp>
         <p:nvSpPr>
-          <p:cNvPr id="148" name="Google Shape;148;p22"/>
+          <p:cNvPr id="150" name="Google Shape;150;p22"/>
           <p:cNvSpPr txBox="1"/>
           <p:nvPr>
             <p:ph type="title"/>
@@ -8261,7 +8261,7 @@
       </p:sp>
       <p:sp>
         <p:nvSpPr>
-          <p:cNvPr id="149" name="Google Shape;149;p22"/>
+          <p:cNvPr id="151" name="Google Shape;151;p22"/>
           <p:cNvSpPr txBox="1"/>
           <p:nvPr>
             <p:ph idx="1" type="body"/>
@@ -8287,20 +8287,56 @@
                 <a:spcPts val="0"/>
               </a:spcBef>
               <a:spcAft>
+                <a:spcPts val="0"/>
+              </a:spcAft>
+              <a:buNone/>
+            </a:pPr>
+            <a:r>
+              <a:rPr lang="pt-BR" sz="2800"/>
+              <a:t>Vários</a:t>
+            </a:r>
+            <a:r>
+              <a:rPr lang="pt-BR" sz="2800"/>
+              <a:t> dispositivos diferentes e performances.</a:t>
+            </a:r>
+            <a:endParaRPr sz="2800"/>
+          </a:p>
+          <a:p>
+            <a:pPr indent="0" lvl="0" marL="0" rtl="0" algn="l">
+              <a:spcBef>
                 <a:spcPts val="1200"/>
+              </a:spcBef>
+              <a:spcAft>
+                <a:spcPts val="0"/>
               </a:spcAft>
               <a:buNone/>
             </a:pPr>
             <a:r>
               <a:t/>
             </a:r>
-            <a:endParaRPr/>
+            <a:endParaRPr sz="2800"/>
+          </a:p>
+          <a:p>
+            <a:pPr indent="0" lvl="0" marL="0" rtl="0" algn="l">
+              <a:spcBef>
+                <a:spcPts val="1200"/>
+              </a:spcBef>
+              <a:spcAft>
+                <a:spcPts val="1200"/>
+              </a:spcAft>
+              <a:buNone/>
+            </a:pPr>
+            <a:r>
+              <a:rPr lang="pt-BR" sz="2800"/>
+              <a:t>Favorece o SEO.</a:t>
+            </a:r>
+            <a:endParaRPr sz="2800"/>
           </a:p>
         </p:txBody>
       </p:sp>
       <p:pic>
         <p:nvPicPr>
-          <p:cNvPr id="150" name="Google Shape;150;p22"/>
+          <p:cNvPr id="152" name="Google Shape;152;p22"/>
           <p:cNvPicPr preferRelativeResize="0"/>
           <p:nvPr/>
         </p:nvPicPr>
@@ -8325,45 +8361,6 @@
           </a:ln>
         </p:spPr>
       </p:pic>
-      <p:sp>
-        <p:nvSpPr>
-          <p:cNvPr id="151" name="Google Shape;151;p22"/>
-          <p:cNvSpPr txBox="1"/>
-          <p:nvPr>
-            <p:ph idx="2" type="title"/>
-          </p:nvPr>
-        </p:nvSpPr>
-        <p:spPr>
-          <a:xfrm>
-            <a:off x="4757550" y="331475"/>
-            <a:ext cx="4200900" cy="873000"/>
-          </a:xfrm>
-          <a:prstGeom prst="rect">
-            <a:avLst/>
-          </a:prstGeom>
-        </p:spPr>
-        <p:txBody>
-          <a:bodyPr anchorCtr="0" anchor="t" bIns="91425" lIns="91425" spcFirstLastPara="1" rIns="91425" wrap="square" tIns="91425">
-            <a:normAutofit/>
-          </a:bodyPr>
-          <a:lstStyle/>
-          <a:p>
-            <a:pPr indent="0" lvl="0" marL="0" rtl="0" algn="l">
-              <a:spcBef>
-                <a:spcPts val="0"/>
-              </a:spcBef>
-              <a:spcAft>
-                <a:spcPts val="0"/>
-              </a:spcAft>
-              <a:buNone/>
-            </a:pPr>
-            <a:r>
-              <a:t/>
-            </a:r>
-            <a:endParaRPr/>
-          </a:p>
-        </p:txBody>
-      </p:sp>
     </p:spTree>
   </p:cSld>
   <p:clrMapOvr>
@@ -8377,7 +8374,7 @@
   <p:cSld>
     <p:spTree>
       <p:nvGrpSpPr>
-        <p:cNvPr id="155" name="Shape 155"/>
+        <p:cNvPr id="156" name="Shape 156"/>
         <p:cNvGrpSpPr/>
         <p:nvPr/>
       </p:nvGrpSpPr>
@@ -8391,7 +8388,7 @@
       </p:grpSpPr>
       <p:sp>
         <p:nvSpPr>
-          <p:cNvPr id="156" name="Google Shape;156;p23"/>
+          <p:cNvPr id="157" name="Google Shape;157;p23"/>
           <p:cNvSpPr txBox="1"/>
           <p:nvPr>
             <p:ph type="title"/>
@@ -8431,7 +8428,7 @@
       </p:sp>
       <p:sp>
         <p:nvSpPr>
-          <p:cNvPr id="157" name="Google Shape;157;p23"/>
+          <p:cNvPr id="158" name="Google Shape;158;p23"/>
           <p:cNvSpPr txBox="1"/>
           <p:nvPr>
             <p:ph idx="1" type="body"/>
@@ -8457,20 +8454,52 @@
                 <a:spcPts val="0"/>
               </a:spcBef>
               <a:spcAft>
+                <a:spcPts val="0"/>
+              </a:spcAft>
+              <a:buNone/>
+            </a:pPr>
+            <a:r>
+              <a:rPr lang="pt-BR" sz="2800"/>
+              <a:t>Sem necessidade de drivers</a:t>
+            </a:r>
+            <a:endParaRPr sz="2800"/>
+          </a:p>
+          <a:p>
+            <a:pPr indent="0" lvl="0" marL="0" rtl="0" algn="l">
+              <a:spcBef>
                 <a:spcPts val="1200"/>
+              </a:spcBef>
+              <a:spcAft>
+                <a:spcPts val="0"/>
               </a:spcAft>
               <a:buNone/>
             </a:pPr>
             <a:r>
               <a:t/>
             </a:r>
-            <a:endParaRPr/>
+            <a:endParaRPr sz="2800"/>
+          </a:p>
+          <a:p>
+            <a:pPr indent="0" lvl="0" marL="0" rtl="0" algn="l">
+              <a:spcBef>
+                <a:spcPts val="1200"/>
+              </a:spcBef>
+              <a:spcAft>
+                <a:spcPts val="1200"/>
+              </a:spcAft>
+              <a:buNone/>
+            </a:pPr>
+            <a:r>
+              <a:rPr lang="pt-BR" sz="2800"/>
+              <a:t>Performance melhor que Selenium</a:t>
+            </a:r>
+            <a:endParaRPr sz="2800"/>
           </a:p>
         </p:txBody>
       </p:sp>
       <p:pic>
         <p:nvPicPr>
-          <p:cNvPr id="158" name="Google Shape;158;p23"/>
+          <p:cNvPr id="159" name="Google Shape;159;p23"/>
           <p:cNvPicPr preferRelativeResize="0"/>
           <p:nvPr/>
         </p:nvPicPr>
@@ -8495,45 +8524,6 @@
           </a:ln>
         </p:spPr>
       </p:pic>
-      <p:sp>
-        <p:nvSpPr>
-          <p:cNvPr id="159" name="Google Shape;159;p23"/>
-          <p:cNvSpPr txBox="1"/>
-          <p:nvPr>
-            <p:ph idx="2" type="title"/>
-          </p:nvPr>
-        </p:nvSpPr>
-        <p:spPr>
-          <a:xfrm>
-            <a:off x="4757550" y="331475"/>
-            <a:ext cx="4200900" cy="873000"/>
-          </a:xfrm>
-          <a:prstGeom prst="rect">
-            <a:avLst/>
-          </a:prstGeom>
-        </p:spPr>
-        <p:txBody>
-          <a:bodyPr anchorCtr="0" anchor="t" bIns="91425" lIns="91425" spcFirstLastPara="1" rIns="91425" wrap="square" tIns="91425">
-            <a:normAutofit/>
-          </a:bodyPr>
-          <a:lstStyle/>
-          <a:p>
-            <a:pPr indent="0" lvl="0" marL="0" rtl="0" algn="l">
-              <a:spcBef>
-                <a:spcPts val="0"/>
-              </a:spcBef>
-              <a:spcAft>
-                <a:spcPts val="0"/>
-              </a:spcAft>
-              <a:buNone/>
-            </a:pPr>
-            <a:r>
-              <a:t/>
-            </a:r>
-            <a:endParaRPr/>
-          </a:p>
-        </p:txBody>
-      </p:sp>
     </p:spTree>
   </p:cSld>
   <p:clrMapOvr>
@@ -8578,7 +8568,7 @@
         </p:spPr>
         <p:txBody>
           <a:bodyPr anchorCtr="0" anchor="ctr" bIns="91425" lIns="91425" spcFirstLastPara="1" rIns="91425" wrap="square" tIns="91425">
-            <a:normAutofit/>
+            <a:noAutofit/>
           </a:bodyPr>
           <a:lstStyle/>
           <a:p>
@@ -8592,93 +8582,16 @@
               <a:buNone/>
             </a:pPr>
             <a:r>
-              <a:t/>
+              <a:rPr lang="pt-BR" sz="7600"/>
+              <a:t>Obrigado</a:t>
             </a:r>
-            <a:endParaRPr/>
-          </a:p>
-        </p:txBody>
-      </p:sp>
-      <p:sp>
-        <p:nvSpPr>
-          <p:cNvPr id="165" name="Google Shape;165;p24"/>
-          <p:cNvSpPr txBox="1"/>
-          <p:nvPr>
-            <p:ph idx="1" type="body"/>
-          </p:nvPr>
-        </p:nvSpPr>
-        <p:spPr>
-          <a:xfrm>
-            <a:off x="4757550" y="1304875"/>
-            <a:ext cx="4200900" cy="3416400"/>
-          </a:xfrm>
-          <a:prstGeom prst="rect">
-            <a:avLst/>
-          </a:prstGeom>
-        </p:spPr>
-        <p:txBody>
-          <a:bodyPr anchorCtr="0" anchor="t" bIns="91425" lIns="91425" spcFirstLastPara="1" rIns="91425" wrap="square" tIns="91425">
-            <a:normAutofit/>
-          </a:bodyPr>
-          <a:lstStyle/>
-          <a:p>
-            <a:pPr indent="0" lvl="0" marL="0" rtl="0" algn="l">
-              <a:spcBef>
-                <a:spcPts val="0"/>
-              </a:spcBef>
-              <a:spcAft>
-                <a:spcPts val="1200"/>
-              </a:spcAft>
-              <a:buNone/>
-            </a:pPr>
-            <a:r>
-              <a:t/>
-            </a:r>
-            <a:endParaRPr/>
-          </a:p>
-        </p:txBody>
-      </p:sp>
-      <p:sp>
-        <p:nvSpPr>
-          <p:cNvPr id="166" name="Google Shape;166;p24"/>
-          <p:cNvSpPr txBox="1"/>
-          <p:nvPr>
-            <p:ph idx="2" type="title"/>
-          </p:nvPr>
-        </p:nvSpPr>
-        <p:spPr>
-          <a:xfrm>
-            <a:off x="4757550" y="331475"/>
-            <a:ext cx="4200900" cy="873000"/>
-          </a:xfrm>
-          <a:prstGeom prst="rect">
-            <a:avLst/>
-          </a:prstGeom>
-        </p:spPr>
-        <p:txBody>
-          <a:bodyPr anchorCtr="0" anchor="t" bIns="91425" lIns="91425" spcFirstLastPara="1" rIns="91425" wrap="square" tIns="91425">
-            <a:normAutofit/>
-          </a:bodyPr>
-          <a:lstStyle/>
-          <a:p>
-            <a:pPr indent="0" lvl="0" marL="0" rtl="0" algn="l">
-              <a:spcBef>
-                <a:spcPts val="0"/>
-              </a:spcBef>
-              <a:spcAft>
-                <a:spcPts val="0"/>
-              </a:spcAft>
-              <a:buNone/>
-            </a:pPr>
-            <a:r>
-              <a:t/>
-            </a:r>
-            <a:endParaRPr/>
+            <a:endParaRPr sz="7600"/>
           </a:p>
         </p:txBody>
       </p:sp>
       <p:pic>
         <p:nvPicPr>
-          <p:cNvPr id="167" name="Google Shape;167;p24"/>
+          <p:cNvPr id="165" name="Google Shape;165;p24"/>
           <p:cNvPicPr preferRelativeResize="0"/>
           <p:nvPr/>
         </p:nvPicPr>
@@ -8703,6 +8616,291 @@
           </a:ln>
         </p:spPr>
       </p:pic>
+      <p:sp>
+        <p:nvSpPr>
+          <p:cNvPr id="166" name="Google Shape;166;p24"/>
+          <p:cNvSpPr txBox="1"/>
+          <p:nvPr/>
+        </p:nvSpPr>
+        <p:spPr>
+          <a:xfrm>
+            <a:off x="6933450" y="4018550"/>
+            <a:ext cx="2025000" cy="749100"/>
+          </a:xfrm>
+          <a:prstGeom prst="rect">
+            <a:avLst/>
+          </a:prstGeom>
+          <a:noFill/>
+          <a:ln>
+            <a:noFill/>
+          </a:ln>
+        </p:spPr>
+        <p:txBody>
+          <a:bodyPr anchorCtr="0" anchor="t" bIns="91425" lIns="91425" spcFirstLastPara="1" rIns="91425" wrap="square" tIns="91425">
+            <a:spAutoFit/>
+          </a:bodyPr>
+          <a:lstStyle/>
+          <a:p>
+            <a:pPr indent="0" lvl="0" marL="0" rtl="0" algn="r">
+              <a:lnSpc>
+                <a:spcPct val="150000"/>
+              </a:lnSpc>
+              <a:spcBef>
+                <a:spcPts val="0"/>
+              </a:spcBef>
+              <a:spcAft>
+                <a:spcPts val="0"/>
+              </a:spcAft>
+              <a:buNone/>
+            </a:pPr>
+            <a:r>
+              <a:rPr lang="pt-BR" sz="1200">
+                <a:solidFill>
+                  <a:schemeClr val="lt1"/>
+                </a:solidFill>
+              </a:rPr>
+              <a:t>Guilherme Pavarina de Sá</a:t>
+            </a:r>
+            <a:endParaRPr sz="1200">
+              <a:solidFill>
+                <a:schemeClr val="lt1"/>
+              </a:solidFill>
+            </a:endParaRPr>
+          </a:p>
+          <a:p>
+            <a:pPr indent="0" lvl="0" marL="0" rtl="0" algn="r">
+              <a:lnSpc>
+                <a:spcPct val="150000"/>
+              </a:lnSpc>
+              <a:spcBef>
+                <a:spcPts val="800"/>
+              </a:spcBef>
+              <a:spcAft>
+                <a:spcPts val="800"/>
+              </a:spcAft>
+              <a:buNone/>
+            </a:pPr>
+            <a:r>
+              <a:rPr lang="pt-BR" sz="1200">
+                <a:solidFill>
+                  <a:schemeClr val="lt1"/>
+                </a:solidFill>
+              </a:rPr>
+              <a:t>Luan Neves da Silva</a:t>
+            </a:r>
+            <a:endParaRPr>
+              <a:solidFill>
+                <a:schemeClr val="lt1"/>
+              </a:solidFill>
+            </a:endParaRPr>
+          </a:p>
+        </p:txBody>
+      </p:sp>
+      <p:pic>
+        <p:nvPicPr>
+          <p:cNvPr id="167" name="Google Shape;167;p24"/>
+          <p:cNvPicPr preferRelativeResize="0"/>
+          <p:nvPr/>
+        </p:nvPicPr>
+        <p:blipFill>
+          <a:blip r:embed="rId4">
+            <a:alphaModFix/>
+          </a:blip>
+          <a:stretch>
+            <a:fillRect/>
+          </a:stretch>
+        </p:blipFill>
+        <p:spPr>
+          <a:xfrm>
+            <a:off x="3680800" y="4070840"/>
+            <a:ext cx="804649" cy="696810"/>
+          </a:xfrm>
+          <a:prstGeom prst="rect">
+            <a:avLst/>
+          </a:prstGeom>
+          <a:noFill/>
+          <a:ln>
+            <a:noFill/>
+          </a:ln>
+        </p:spPr>
+      </p:pic>
+      <p:sp>
+        <p:nvSpPr>
+          <p:cNvPr id="168" name="Google Shape;168;p24"/>
+          <p:cNvSpPr txBox="1"/>
+          <p:nvPr>
+            <p:ph idx="1" type="body"/>
+          </p:nvPr>
+        </p:nvSpPr>
+        <p:spPr>
+          <a:xfrm>
+            <a:off x="4632575" y="470275"/>
+            <a:ext cx="4472700" cy="3069900"/>
+          </a:xfrm>
+          <a:prstGeom prst="rect">
+            <a:avLst/>
+          </a:prstGeom>
+        </p:spPr>
+        <p:txBody>
+          <a:bodyPr anchorCtr="0" anchor="t" bIns="91425" lIns="91425" spcFirstLastPara="1" rIns="91425" wrap="square" tIns="91425">
+            <a:normAutofit/>
+          </a:bodyPr>
+          <a:lstStyle/>
+          <a:p>
+            <a:pPr indent="-342900" lvl="0" marL="457200" rtl="0" algn="l">
+              <a:spcBef>
+                <a:spcPts val="0"/>
+              </a:spcBef>
+              <a:spcAft>
+                <a:spcPts val="0"/>
+              </a:spcAft>
+              <a:buSzPts val="1800"/>
+              <a:buChar char="❖"/>
+            </a:pPr>
+            <a:r>
+              <a:rPr lang="pt-BR"/>
+              <a:t>TypeScript</a:t>
+            </a:r>
+            <a:endParaRPr/>
+          </a:p>
+          <a:p>
+            <a:pPr indent="-342900" lvl="0" marL="457200" rtl="0" algn="l">
+              <a:spcBef>
+                <a:spcPts val="0"/>
+              </a:spcBef>
+              <a:spcAft>
+                <a:spcPts val="0"/>
+              </a:spcAft>
+              <a:buSzPts val="1800"/>
+              <a:buChar char="❖"/>
+            </a:pPr>
+            <a:r>
+              <a:rPr lang="pt-BR"/>
+              <a:t>VScode</a:t>
+            </a:r>
+            <a:endParaRPr/>
+          </a:p>
+          <a:p>
+            <a:pPr indent="-342900" lvl="0" marL="457200" rtl="0" algn="l">
+              <a:spcBef>
+                <a:spcPts val="0"/>
+              </a:spcBef>
+              <a:spcAft>
+                <a:spcPts val="0"/>
+              </a:spcAft>
+              <a:buSzPts val="1800"/>
+              <a:buChar char="❖"/>
+            </a:pPr>
+            <a:r>
+              <a:rPr lang="pt-BR"/>
+              <a:t>OOCSS</a:t>
+            </a:r>
+            <a:endParaRPr/>
+          </a:p>
+          <a:p>
+            <a:pPr indent="-342900" lvl="0" marL="457200" rtl="0" algn="l">
+              <a:spcBef>
+                <a:spcPts val="0"/>
+              </a:spcBef>
+              <a:spcAft>
+                <a:spcPts val="0"/>
+              </a:spcAft>
+              <a:buSzPts val="1800"/>
+              <a:buChar char="❖"/>
+            </a:pPr>
+            <a:r>
+              <a:rPr lang="pt-BR"/>
+              <a:t>Material Design</a:t>
+            </a:r>
+            <a:endParaRPr/>
+          </a:p>
+          <a:p>
+            <a:pPr indent="-342900" lvl="0" marL="457200" rtl="0" algn="l">
+              <a:spcBef>
+                <a:spcPts val="0"/>
+              </a:spcBef>
+              <a:spcAft>
+                <a:spcPts val="0"/>
+              </a:spcAft>
+              <a:buSzPts val="1800"/>
+              <a:buChar char="❖"/>
+            </a:pPr>
+            <a:r>
+              <a:rPr lang="pt-BR"/>
+              <a:t>Angular</a:t>
+            </a:r>
+            <a:endParaRPr/>
+          </a:p>
+          <a:p>
+            <a:pPr indent="-342900" lvl="0" marL="457200" rtl="0" algn="l">
+              <a:spcBef>
+                <a:spcPts val="0"/>
+              </a:spcBef>
+              <a:spcAft>
+                <a:spcPts val="0"/>
+              </a:spcAft>
+              <a:buSzPts val="1800"/>
+              <a:buChar char="❖"/>
+            </a:pPr>
+            <a:r>
+              <a:rPr lang="pt-BR"/>
+              <a:t>npm</a:t>
+            </a:r>
+            <a:endParaRPr/>
+          </a:p>
+          <a:p>
+            <a:pPr indent="-342900" lvl="0" marL="457200" rtl="0" algn="l">
+              <a:spcBef>
+                <a:spcPts val="0"/>
+              </a:spcBef>
+              <a:spcAft>
+                <a:spcPts val="0"/>
+              </a:spcAft>
+              <a:buSzPts val="1800"/>
+              <a:buChar char="❖"/>
+            </a:pPr>
+            <a:r>
+              <a:rPr lang="pt-BR"/>
+              <a:t>Mono Repos</a:t>
+            </a:r>
+            <a:endParaRPr/>
+          </a:p>
+          <a:p>
+            <a:pPr indent="-342900" lvl="0" marL="457200" rtl="0" algn="l">
+              <a:spcBef>
+                <a:spcPts val="0"/>
+              </a:spcBef>
+              <a:spcAft>
+                <a:spcPts val="0"/>
+              </a:spcAft>
+              <a:buSzPts val="1800"/>
+              <a:buChar char="❖"/>
+            </a:pPr>
+            <a:r>
+              <a:rPr lang="pt-BR"/>
+              <a:t>Server-Side Rendering</a:t>
+            </a:r>
+            <a:endParaRPr/>
+          </a:p>
+          <a:p>
+            <a:pPr indent="-342900" lvl="0" marL="457200" rtl="0" algn="l">
+              <a:spcBef>
+                <a:spcPts val="0"/>
+              </a:spcBef>
+              <a:spcAft>
+                <a:spcPts val="0"/>
+              </a:spcAft>
+              <a:buSzPts val="1800"/>
+              <a:buChar char="❖"/>
+            </a:pPr>
+            <a:r>
+              <a:rPr lang="pt-BR"/>
+              <a:t>Cypress</a:t>
+            </a:r>
+            <a:endParaRPr/>
+          </a:p>
+        </p:txBody>
+      </p:sp>
     </p:spTree>
   </p:cSld>
   <p:clrMapOvr>
@@ -8746,7 +8944,7 @@
           </a:prstGeom>
         </p:spPr>
         <p:txBody>
-          <a:bodyPr anchorCtr="0" anchor="t" bIns="91425" lIns="91425" spcFirstLastPara="1" rIns="91425" wrap="square" tIns="91425">
+          <a:bodyPr anchorCtr="0" anchor="ctr" bIns="91425" lIns="91425" spcFirstLastPara="1" rIns="91425" wrap="square" tIns="91425">
             <a:normAutofit/>
           </a:bodyPr>
           <a:lstStyle/>
@@ -8976,7 +9174,7 @@
           </a:prstGeom>
         </p:spPr>
         <p:txBody>
-          <a:bodyPr anchorCtr="0" anchor="t" bIns="91425" lIns="91425" spcFirstLastPara="1" rIns="91425" wrap="square" tIns="91425">
+          <a:bodyPr anchorCtr="0" anchor="ctr" bIns="91425" lIns="91425" spcFirstLastPara="1" rIns="91425" wrap="square" tIns="91425">
             <a:noAutofit/>
           </a:bodyPr>
           <a:lstStyle/>
@@ -9016,7 +9214,7 @@
           </a:prstGeom>
         </p:spPr>
         <p:txBody>
-          <a:bodyPr anchorCtr="0" anchor="t" bIns="91425" lIns="91425" spcFirstLastPara="1" rIns="91425" wrap="square" tIns="91425">
+          <a:bodyPr anchorCtr="0" anchor="ctr" bIns="91425" lIns="91425" spcFirstLastPara="1" rIns="91425" wrap="square" tIns="91425">
             <a:normAutofit/>
           </a:bodyPr>
           <a:lstStyle/>
@@ -9979,21 +10177,21 @@
           <p:cNvPr id="92" name="Google Shape;92;p15"/>
           <p:cNvSpPr txBox="1"/>
           <p:nvPr>
-            <p:ph idx="1" type="body"/>
+            <p:ph idx="2" type="title"/>
           </p:nvPr>
         </p:nvSpPr>
         <p:spPr>
           <a:xfrm>
-            <a:off x="4757550" y="1304875"/>
-            <a:ext cx="4200900" cy="3416400"/>
+            <a:off x="4786250" y="1367675"/>
+            <a:ext cx="4200900" cy="873000"/>
           </a:xfrm>
           <a:prstGeom prst="rect">
             <a:avLst/>
           </a:prstGeom>
         </p:spPr>
         <p:txBody>
-          <a:bodyPr anchorCtr="0" anchor="t" bIns="91425" lIns="91425" spcFirstLastPara="1" rIns="91425" wrap="square" tIns="91425">
-            <a:normAutofit/>
+          <a:bodyPr anchorCtr="0" anchor="ctr" bIns="91425" lIns="91425" spcFirstLastPara="1" rIns="91425" wrap="square" tIns="91425">
+            <a:normAutofit fontScale="90000"/>
           </a:bodyPr>
           <a:lstStyle/>
           <a:p>
@@ -10002,51 +10200,13 @@
                 <a:spcPts val="0"/>
               </a:spcBef>
               <a:spcAft>
-                <a:spcPts val="1200"/>
+                <a:spcPts val="0"/>
               </a:spcAft>
               <a:buNone/>
             </a:pPr>
             <a:r>
-              <a:t/>
-            </a:r>
-            <a:endParaRPr/>
-          </a:p>
-        </p:txBody>
-      </p:sp>
-      <p:sp>
-        <p:nvSpPr>
-          <p:cNvPr id="93" name="Google Shape;93;p15"/>
-          <p:cNvSpPr txBox="1"/>
-          <p:nvPr>
-            <p:ph idx="2" type="title"/>
-          </p:nvPr>
-        </p:nvSpPr>
-        <p:spPr>
-          <a:xfrm>
-            <a:off x="4757550" y="331475"/>
-            <a:ext cx="4200900" cy="873000"/>
-          </a:xfrm>
-          <a:prstGeom prst="rect">
-            <a:avLst/>
-          </a:prstGeom>
-        </p:spPr>
-        <p:txBody>
-          <a:bodyPr anchorCtr="0" anchor="t" bIns="91425" lIns="91425" spcFirstLastPara="1" rIns="91425" wrap="square" tIns="91425">
-            <a:normAutofit/>
-          </a:bodyPr>
-          <a:lstStyle/>
-          <a:p>
-            <a:pPr indent="0" lvl="0" marL="0" rtl="0" algn="l">
-              <a:spcBef>
-                <a:spcPts val="0"/>
-              </a:spcBef>
-              <a:spcAft>
-                <a:spcPts val="0"/>
-              </a:spcAft>
-              <a:buNone/>
-            </a:pPr>
-            <a:r>
-              <a:t/>
+              <a:rPr lang="pt-BR"/>
+              <a:t>Background com Java e C</a:t>
             </a:r>
             <a:endParaRPr/>
           </a:p>
@@ -10054,7 +10214,7 @@
       </p:sp>
       <p:pic>
         <p:nvPicPr>
-          <p:cNvPr id="94" name="Google Shape;94;p15"/>
+          <p:cNvPr id="93" name="Google Shape;93;p15"/>
           <p:cNvPicPr preferRelativeResize="0"/>
           <p:nvPr/>
         </p:nvPicPr>
@@ -10081,7 +10241,7 @@
       </p:pic>
       <p:sp>
         <p:nvSpPr>
-          <p:cNvPr id="95" name="Google Shape;95;p15"/>
+          <p:cNvPr id="94" name="Google Shape;94;p15"/>
           <p:cNvSpPr txBox="1"/>
           <p:nvPr>
             <p:ph type="title"/>
@@ -10116,6 +10276,47 @@
               <a:t>Back End</a:t>
             </a:r>
             <a:endParaRPr sz="7600"/>
+          </a:p>
+        </p:txBody>
+      </p:sp>
+      <p:sp>
+        <p:nvSpPr>
+          <p:cNvPr id="95" name="Google Shape;95;p15"/>
+          <p:cNvSpPr txBox="1"/>
+          <p:nvPr>
+            <p:ph idx="2" type="title"/>
+          </p:nvPr>
+        </p:nvSpPr>
+        <p:spPr>
+          <a:xfrm>
+            <a:off x="4641425" y="2423950"/>
+            <a:ext cx="4502700" cy="873000"/>
+          </a:xfrm>
+          <a:prstGeom prst="rect">
+            <a:avLst/>
+          </a:prstGeom>
+        </p:spPr>
+        <p:txBody>
+          <a:bodyPr anchorCtr="0" anchor="ctr" bIns="91425" lIns="91425" spcFirstLastPara="1" rIns="91425" wrap="square" tIns="91425">
+            <a:noAutofit/>
+          </a:bodyPr>
+          <a:lstStyle/>
+          <a:p>
+            <a:pPr indent="0" lvl="0" marL="0" rtl="0" algn="l">
+              <a:spcBef>
+                <a:spcPts val="0"/>
+              </a:spcBef>
+              <a:spcAft>
+                <a:spcPts val="0"/>
+              </a:spcAft>
+              <a:buSzPts val="990"/>
+              <a:buNone/>
+            </a:pPr>
+            <a:r>
+              <a:rPr lang="pt-BR" sz="2420"/>
+              <a:t>Estimativas de desenvolvimento serão respeitadas</a:t>
+            </a:r>
+            <a:endParaRPr sz="2420"/>
           </a:p>
         </p:txBody>
       </p:sp>
@@ -10184,48 +10385,9 @@
           </a:p>
         </p:txBody>
       </p:sp>
-      <p:sp>
-        <p:nvSpPr>
-          <p:cNvPr id="101" name="Google Shape;101;p16"/>
-          <p:cNvSpPr txBox="1"/>
-          <p:nvPr>
-            <p:ph idx="1" type="body"/>
-          </p:nvPr>
-        </p:nvSpPr>
-        <p:spPr>
-          <a:xfrm>
-            <a:off x="4757550" y="1304875"/>
-            <a:ext cx="4200900" cy="3416400"/>
-          </a:xfrm>
-          <a:prstGeom prst="rect">
-            <a:avLst/>
-          </a:prstGeom>
-        </p:spPr>
-        <p:txBody>
-          <a:bodyPr anchorCtr="0" anchor="t" bIns="91425" lIns="91425" spcFirstLastPara="1" rIns="91425" wrap="square" tIns="91425">
-            <a:normAutofit/>
-          </a:bodyPr>
-          <a:lstStyle/>
-          <a:p>
-            <a:pPr indent="0" lvl="0" marL="0" rtl="0" algn="l">
-              <a:spcBef>
-                <a:spcPts val="0"/>
-              </a:spcBef>
-              <a:spcAft>
-                <a:spcPts val="1200"/>
-              </a:spcAft>
-              <a:buNone/>
-            </a:pPr>
-            <a:r>
-              <a:t/>
-            </a:r>
-            <a:endParaRPr/>
-          </a:p>
-        </p:txBody>
-      </p:sp>
       <p:pic>
         <p:nvPicPr>
-          <p:cNvPr id="102" name="Google Shape;102;p16"/>
+          <p:cNvPr id="101" name="Google Shape;101;p16"/>
           <p:cNvPicPr preferRelativeResize="0"/>
           <p:nvPr/>
         </p:nvPicPr>
@@ -10252,6 +10414,46 @@
       </p:pic>
       <p:sp>
         <p:nvSpPr>
+          <p:cNvPr id="102" name="Google Shape;102;p16"/>
+          <p:cNvSpPr txBox="1"/>
+          <p:nvPr>
+            <p:ph idx="2" type="title"/>
+          </p:nvPr>
+        </p:nvSpPr>
+        <p:spPr>
+          <a:xfrm>
+            <a:off x="4757550" y="331475"/>
+            <a:ext cx="4200900" cy="873000"/>
+          </a:xfrm>
+          <a:prstGeom prst="rect">
+            <a:avLst/>
+          </a:prstGeom>
+        </p:spPr>
+        <p:txBody>
+          <a:bodyPr anchorCtr="0" anchor="ctr" bIns="91425" lIns="91425" spcFirstLastPara="1" rIns="91425" wrap="square" tIns="91425">
+            <a:normAutofit/>
+          </a:bodyPr>
+          <a:lstStyle/>
+          <a:p>
+            <a:pPr indent="0" lvl="0" marL="0" rtl="0" algn="l">
+              <a:spcBef>
+                <a:spcPts val="0"/>
+              </a:spcBef>
+              <a:spcAft>
+                <a:spcPts val="0"/>
+              </a:spcAft>
+              <a:buNone/>
+            </a:pPr>
+            <a:r>
+              <a:rPr lang="pt-BR"/>
+              <a:t>Background do time</a:t>
+            </a:r>
+            <a:endParaRPr/>
+          </a:p>
+        </p:txBody>
+      </p:sp>
+      <p:sp>
+        <p:nvSpPr>
           <p:cNvPr id="103" name="Google Shape;103;p16"/>
           <p:cNvSpPr txBox="1"/>
           <p:nvPr>
@@ -10260,7 +10462,7 @@
         </p:nvSpPr>
         <p:spPr>
           <a:xfrm>
-            <a:off x="4757550" y="331475"/>
+            <a:off x="4757550" y="2438350"/>
             <a:ext cx="4200900" cy="873000"/>
           </a:xfrm>
           <a:prstGeom prst="rect">
@@ -10268,7 +10470,7 @@
           </a:prstGeom>
         </p:spPr>
         <p:txBody>
-          <a:bodyPr anchorCtr="0" anchor="t" bIns="91425" lIns="91425" spcFirstLastPara="1" rIns="91425" wrap="square" tIns="91425">
+          <a:bodyPr anchorCtr="0" anchor="ctr" bIns="91425" lIns="91425" spcFirstLastPara="1" rIns="91425" wrap="square" tIns="91425">
             <a:normAutofit/>
           </a:bodyPr>
           <a:lstStyle/>
@@ -10283,7 +10485,48 @@
               <a:buNone/>
             </a:pPr>
             <a:r>
-              <a:t/>
+              <a:rPr lang="pt-BR"/>
+              <a:t>Curva de aprendizado</a:t>
+            </a:r>
+            <a:endParaRPr/>
+          </a:p>
+        </p:txBody>
+      </p:sp>
+      <p:sp>
+        <p:nvSpPr>
+          <p:cNvPr id="104" name="Google Shape;104;p16"/>
+          <p:cNvSpPr txBox="1"/>
+          <p:nvPr>
+            <p:ph idx="2" type="title"/>
+          </p:nvPr>
+        </p:nvSpPr>
+        <p:spPr>
+          <a:xfrm>
+            <a:off x="4757550" y="1335375"/>
+            <a:ext cx="4200900" cy="873000"/>
+          </a:xfrm>
+          <a:prstGeom prst="rect">
+            <a:avLst/>
+          </a:prstGeom>
+        </p:spPr>
+        <p:txBody>
+          <a:bodyPr anchorCtr="0" anchor="ctr" bIns="91425" lIns="91425" spcFirstLastPara="1" rIns="91425" wrap="square" tIns="91425">
+            <a:normAutofit/>
+          </a:bodyPr>
+          <a:lstStyle/>
+          <a:p>
+            <a:pPr indent="0" lvl="0" marL="0" rtl="0" algn="l">
+              <a:spcBef>
+                <a:spcPts val="0"/>
+              </a:spcBef>
+              <a:spcAft>
+                <a:spcPts val="0"/>
+              </a:spcAft>
+              <a:buNone/>
+            </a:pPr>
+            <a:r>
+              <a:rPr lang="pt-BR"/>
+              <a:t>Tipagem</a:t>
             </a:r>
             <a:endParaRPr/>
           </a:p>
@@ -10302,7 +10545,7 @@
   <p:cSld>
     <p:spTree>
       <p:nvGrpSpPr>
-        <p:cNvPr id="107" name="Shape 107"/>
+        <p:cNvPr id="108" name="Shape 108"/>
         <p:cNvGrpSpPr/>
         <p:nvPr/>
       </p:nvGrpSpPr>
@@ -10316,7 +10559,7 @@
       </p:grpSpPr>
       <p:sp>
         <p:nvSpPr>
-          <p:cNvPr id="108" name="Google Shape;108;p17"/>
+          <p:cNvPr id="109" name="Google Shape;109;p17"/>
           <p:cNvSpPr txBox="1"/>
           <p:nvPr>
             <p:ph type="title"/>
@@ -10351,45 +10594,6 @@
               <a:t>VSCode</a:t>
             </a:r>
             <a:endParaRPr sz="8700"/>
-          </a:p>
-        </p:txBody>
-      </p:sp>
-      <p:sp>
-        <p:nvSpPr>
-          <p:cNvPr id="109" name="Google Shape;109;p17"/>
-          <p:cNvSpPr txBox="1"/>
-          <p:nvPr>
-            <p:ph idx="1" type="body"/>
-          </p:nvPr>
-        </p:nvSpPr>
-        <p:spPr>
-          <a:xfrm>
-            <a:off x="4757550" y="1304875"/>
-            <a:ext cx="4200900" cy="3416400"/>
-          </a:xfrm>
-          <a:prstGeom prst="rect">
-            <a:avLst/>
-          </a:prstGeom>
-        </p:spPr>
-        <p:txBody>
-          <a:bodyPr anchorCtr="0" anchor="t" bIns="91425" lIns="91425" spcFirstLastPara="1" rIns="91425" wrap="square" tIns="91425">
-            <a:normAutofit/>
-          </a:bodyPr>
-          <a:lstStyle/>
-          <a:p>
-            <a:pPr indent="0" lvl="0" marL="0" rtl="0" algn="l">
-              <a:spcBef>
-                <a:spcPts val="0"/>
-              </a:spcBef>
-              <a:spcAft>
-                <a:spcPts val="1200"/>
-              </a:spcAft>
-              <a:buNone/>
-            </a:pPr>
-            <a:r>
-              <a:t/>
-            </a:r>
-            <a:endParaRPr/>
           </a:p>
         </p:txBody>
       </p:sp>
@@ -10430,7 +10634,7 @@
         </p:nvSpPr>
         <p:spPr>
           <a:xfrm>
-            <a:off x="4757550" y="331475"/>
+            <a:off x="4757550" y="173650"/>
             <a:ext cx="4200900" cy="873000"/>
           </a:xfrm>
           <a:prstGeom prst="rect">
@@ -10438,7 +10642,7 @@
           </a:prstGeom>
         </p:spPr>
         <p:txBody>
-          <a:bodyPr anchorCtr="0" anchor="t" bIns="91425" lIns="91425" spcFirstLastPara="1" rIns="91425" wrap="square" tIns="91425">
+          <a:bodyPr anchorCtr="0" anchor="ctr" bIns="91425" lIns="91425" spcFirstLastPara="1" rIns="91425" wrap="square" tIns="91425">
             <a:normAutofit/>
           </a:bodyPr>
           <a:lstStyle/>
@@ -10453,7 +10657,128 @@
               <a:buNone/>
             </a:pPr>
             <a:r>
-              <a:t/>
+              <a:rPr lang="pt-BR"/>
+              <a:t>Integração</a:t>
+            </a:r>
+            <a:endParaRPr/>
+          </a:p>
+        </p:txBody>
+      </p:sp>
+      <p:sp>
+        <p:nvSpPr>
+          <p:cNvPr id="112" name="Google Shape;112;p17"/>
+          <p:cNvSpPr txBox="1"/>
+          <p:nvPr>
+            <p:ph idx="2" type="title"/>
+          </p:nvPr>
+        </p:nvSpPr>
+        <p:spPr>
+          <a:xfrm>
+            <a:off x="4757550" y="1238050"/>
+            <a:ext cx="4200900" cy="873000"/>
+          </a:xfrm>
+          <a:prstGeom prst="rect">
+            <a:avLst/>
+          </a:prstGeom>
+        </p:spPr>
+        <p:txBody>
+          <a:bodyPr anchorCtr="0" anchor="ctr" bIns="91425" lIns="91425" spcFirstLastPara="1" rIns="91425" wrap="square" tIns="91425">
+            <a:normAutofit/>
+          </a:bodyPr>
+          <a:lstStyle/>
+          <a:p>
+            <a:pPr indent="0" lvl="0" marL="0" rtl="0" algn="l">
+              <a:spcBef>
+                <a:spcPts val="0"/>
+              </a:spcBef>
+              <a:spcAft>
+                <a:spcPts val="0"/>
+              </a:spcAft>
+              <a:buNone/>
+            </a:pPr>
+            <a:r>
+              <a:rPr lang="pt-BR"/>
+              <a:t>Snnipets de código</a:t>
+            </a:r>
+            <a:endParaRPr/>
+          </a:p>
+        </p:txBody>
+      </p:sp>
+      <p:sp>
+        <p:nvSpPr>
+          <p:cNvPr id="113" name="Google Shape;113;p17"/>
+          <p:cNvSpPr txBox="1"/>
+          <p:nvPr>
+            <p:ph idx="2" type="title"/>
+          </p:nvPr>
+        </p:nvSpPr>
+        <p:spPr>
+          <a:xfrm>
+            <a:off x="4757550" y="2459313"/>
+            <a:ext cx="4200900" cy="873000"/>
+          </a:xfrm>
+          <a:prstGeom prst="rect">
+            <a:avLst/>
+          </a:prstGeom>
+        </p:spPr>
+        <p:txBody>
+          <a:bodyPr anchorCtr="0" anchor="ctr" bIns="91425" lIns="91425" spcFirstLastPara="1" rIns="91425" wrap="square" tIns="91425">
+            <a:normAutofit/>
+          </a:bodyPr>
+          <a:lstStyle/>
+          <a:p>
+            <a:pPr indent="0" lvl="0" marL="0" rtl="0" algn="l">
+              <a:spcBef>
+                <a:spcPts val="0"/>
+              </a:spcBef>
+              <a:spcAft>
+                <a:spcPts val="0"/>
+              </a:spcAft>
+              <a:buNone/>
+            </a:pPr>
+            <a:r>
+              <a:rPr lang="pt-BR"/>
+              <a:t>Sonar</a:t>
+            </a:r>
+            <a:endParaRPr/>
+          </a:p>
+        </p:txBody>
+      </p:sp>
+      <p:sp>
+        <p:nvSpPr>
+          <p:cNvPr id="114" name="Google Shape;114;p17"/>
+          <p:cNvSpPr txBox="1"/>
+          <p:nvPr>
+            <p:ph idx="2" type="title"/>
+          </p:nvPr>
+        </p:nvSpPr>
+        <p:spPr>
+          <a:xfrm>
+            <a:off x="4757550" y="3680575"/>
+            <a:ext cx="4200900" cy="873000"/>
+          </a:xfrm>
+          <a:prstGeom prst="rect">
+            <a:avLst/>
+          </a:prstGeom>
+        </p:spPr>
+        <p:txBody>
+          <a:bodyPr anchorCtr="0" anchor="ctr" bIns="91425" lIns="91425" spcFirstLastPara="1" rIns="91425" wrap="square" tIns="91425">
+            <a:normAutofit/>
+          </a:bodyPr>
+          <a:lstStyle/>
+          <a:p>
+            <a:pPr indent="0" lvl="0" marL="0" rtl="0" algn="l">
+              <a:spcBef>
+                <a:spcPts val="0"/>
+              </a:spcBef>
+              <a:spcAft>
+                <a:spcPts val="0"/>
+              </a:spcAft>
+              <a:buNone/>
+            </a:pPr>
+            <a:r>
+              <a:rPr lang="pt-BR"/>
+              <a:t>ESLint</a:t>
             </a:r>
             <a:endParaRPr/>
           </a:p>
@@ -10472,7 +10797,7 @@
   <p:cSld>
     <p:spTree>
       <p:nvGrpSpPr>
-        <p:cNvPr id="115" name="Shape 115"/>
+        <p:cNvPr id="118" name="Shape 118"/>
         <p:cNvGrpSpPr/>
         <p:nvPr/>
       </p:nvGrpSpPr>
@@ -10486,7 +10811,7 @@
       </p:grpSpPr>
       <p:sp>
         <p:nvSpPr>
-          <p:cNvPr id="116" name="Google Shape;116;p18"/>
+          <p:cNvPr id="119" name="Google Shape;119;p18"/>
           <p:cNvSpPr txBox="1"/>
           <p:nvPr>
             <p:ph type="title"/>
@@ -10524,48 +10849,9 @@
           </a:p>
         </p:txBody>
       </p:sp>
-      <p:sp>
-        <p:nvSpPr>
-          <p:cNvPr id="117" name="Google Shape;117;p18"/>
-          <p:cNvSpPr txBox="1"/>
-          <p:nvPr>
-            <p:ph idx="1" type="body"/>
-          </p:nvPr>
-        </p:nvSpPr>
-        <p:spPr>
-          <a:xfrm>
-            <a:off x="4757550" y="1304875"/>
-            <a:ext cx="4200900" cy="3416400"/>
-          </a:xfrm>
-          <a:prstGeom prst="rect">
-            <a:avLst/>
-          </a:prstGeom>
-        </p:spPr>
-        <p:txBody>
-          <a:bodyPr anchorCtr="0" anchor="t" bIns="91425" lIns="91425" spcFirstLastPara="1" rIns="91425" wrap="square" tIns="91425">
-            <a:normAutofit/>
-          </a:bodyPr>
-          <a:lstStyle/>
-          <a:p>
-            <a:pPr indent="0" lvl="0" marL="0" rtl="0" algn="l">
-              <a:spcBef>
-                <a:spcPts val="0"/>
-              </a:spcBef>
-              <a:spcAft>
-                <a:spcPts val="1200"/>
-              </a:spcAft>
-              <a:buNone/>
-            </a:pPr>
-            <a:r>
-              <a:t/>
-            </a:r>
-            <a:endParaRPr/>
-          </a:p>
-        </p:txBody>
-      </p:sp>
       <p:pic>
         <p:nvPicPr>
-          <p:cNvPr id="118" name="Google Shape;118;p18"/>
+          <p:cNvPr id="120" name="Google Shape;120;p18"/>
           <p:cNvPicPr preferRelativeResize="0"/>
           <p:nvPr/>
         </p:nvPicPr>
@@ -10592,7 +10878,7 @@
       </p:pic>
       <p:sp>
         <p:nvSpPr>
-          <p:cNvPr id="119" name="Google Shape;119;p18"/>
+          <p:cNvPr id="121" name="Google Shape;121;p18"/>
           <p:cNvSpPr txBox="1"/>
           <p:nvPr>
             <p:ph idx="2" type="title"/>
@@ -10608,7 +10894,7 @@
           </a:prstGeom>
         </p:spPr>
         <p:txBody>
-          <a:bodyPr anchorCtr="0" anchor="t" bIns="91425" lIns="91425" spcFirstLastPara="1" rIns="91425" wrap="square" tIns="91425">
+          <a:bodyPr anchorCtr="0" anchor="ctr" bIns="91425" lIns="91425" spcFirstLastPara="1" rIns="91425" wrap="square" tIns="91425">
             <a:normAutofit/>
           </a:bodyPr>
           <a:lstStyle/>
@@ -10623,9 +10909,131 @@
               <a:buNone/>
             </a:pPr>
             <a:r>
-              <a:t/>
+              <a:rPr lang="pt-BR"/>
+              <a:t>SCSS</a:t>
             </a:r>
             <a:endParaRPr/>
+          </a:p>
+        </p:txBody>
+      </p:sp>
+      <p:sp>
+        <p:nvSpPr>
+          <p:cNvPr id="122" name="Google Shape;122;p18"/>
+          <p:cNvSpPr txBox="1"/>
+          <p:nvPr>
+            <p:ph idx="2" type="title"/>
+          </p:nvPr>
+        </p:nvSpPr>
+        <p:spPr>
+          <a:xfrm>
+            <a:off x="4757550" y="1277600"/>
+            <a:ext cx="4200900" cy="873000"/>
+          </a:xfrm>
+          <a:prstGeom prst="rect">
+            <a:avLst/>
+          </a:prstGeom>
+        </p:spPr>
+        <p:txBody>
+          <a:bodyPr anchorCtr="0" anchor="ctr" bIns="91425" lIns="91425" spcFirstLastPara="1" rIns="91425" wrap="square" tIns="91425">
+            <a:normAutofit/>
+          </a:bodyPr>
+          <a:lstStyle/>
+          <a:p>
+            <a:pPr indent="0" lvl="0" marL="0" rtl="0" algn="l">
+              <a:spcBef>
+                <a:spcPts val="0"/>
+              </a:spcBef>
+              <a:spcAft>
+                <a:spcPts val="0"/>
+              </a:spcAft>
+              <a:buNone/>
+            </a:pPr>
+            <a:r>
+              <a:rPr lang="pt-BR"/>
+              <a:t>Nomes mais enxutos</a:t>
+            </a:r>
+            <a:endParaRPr/>
+          </a:p>
+        </p:txBody>
+      </p:sp>
+      <p:sp>
+        <p:nvSpPr>
+          <p:cNvPr id="123" name="Google Shape;123;p18"/>
+          <p:cNvSpPr txBox="1"/>
+          <p:nvPr>
+            <p:ph idx="2" type="title"/>
+          </p:nvPr>
+        </p:nvSpPr>
+        <p:spPr>
+          <a:xfrm>
+            <a:off x="4757550" y="3413800"/>
+            <a:ext cx="4200900" cy="873000"/>
+          </a:xfrm>
+          <a:prstGeom prst="rect">
+            <a:avLst/>
+          </a:prstGeom>
+        </p:spPr>
+        <p:txBody>
+          <a:bodyPr anchorCtr="0" anchor="ctr" bIns="91425" lIns="91425" spcFirstLastPara="1" rIns="91425" wrap="square" tIns="91425">
+            <a:normAutofit/>
+          </a:bodyPr>
+          <a:lstStyle/>
+          <a:p>
+            <a:pPr indent="0" lvl="0" marL="0" rtl="0" algn="l">
+              <a:spcBef>
+                <a:spcPts val="0"/>
+              </a:spcBef>
+              <a:spcAft>
+                <a:spcPts val="0"/>
+              </a:spcAft>
+              <a:buNone/>
+            </a:pPr>
+            <a:r>
+              <a:rPr lang="pt-BR"/>
+              <a:t>Material Design</a:t>
+            </a:r>
+            <a:endParaRPr/>
+          </a:p>
+        </p:txBody>
+      </p:sp>
+      <p:sp>
+        <p:nvSpPr>
+          <p:cNvPr id="124" name="Google Shape;124;p18"/>
+          <p:cNvSpPr txBox="1"/>
+          <p:nvPr>
+            <p:ph idx="2" type="title"/>
+          </p:nvPr>
+        </p:nvSpPr>
+        <p:spPr>
+          <a:xfrm>
+            <a:off x="4757550" y="2424800"/>
+            <a:ext cx="4200900" cy="873000"/>
+          </a:xfrm>
+          <a:prstGeom prst="rect">
+            <a:avLst/>
+          </a:prstGeom>
+        </p:spPr>
+        <p:txBody>
+          <a:bodyPr anchorCtr="0" anchor="ctr" bIns="91425" lIns="91425" spcFirstLastPara="1" rIns="91425" wrap="square" tIns="91425">
+            <a:noAutofit/>
+          </a:bodyPr>
+          <a:lstStyle/>
+          <a:p>
+            <a:pPr indent="0" lvl="0" marL="0" rtl="0" algn="l">
+              <a:spcBef>
+                <a:spcPts val="0"/>
+              </a:spcBef>
+              <a:spcAft>
+                <a:spcPts val="0"/>
+              </a:spcAft>
+              <a:buSzPts val="990"/>
+              <a:buNone/>
+            </a:pPr>
+            <a:r>
+              <a:rPr lang="pt-BR" sz="2320"/>
+              <a:t>Modularização Skin/Container</a:t>
+            </a:r>
+            <a:endParaRPr sz="2320"/>
           </a:p>
         </p:txBody>
       </p:sp>
@@ -10642,7 +11050,7 @@
   <p:cSld>
     <p:spTree>
       <p:nvGrpSpPr>
-        <p:cNvPr id="123" name="Shape 123"/>
+        <p:cNvPr id="128" name="Shape 128"/>
         <p:cNvGrpSpPr/>
         <p:nvPr/>
       </p:nvGrpSpPr>
@@ -10656,7 +11064,7 @@
       </p:grpSpPr>
       <p:sp>
         <p:nvSpPr>
-          <p:cNvPr id="124" name="Google Shape;124;p19"/>
+          <p:cNvPr id="129" name="Google Shape;129;p19"/>
           <p:cNvSpPr txBox="1"/>
           <p:nvPr>
             <p:ph type="title"/>
@@ -10696,7 +11104,7 @@
       </p:sp>
       <p:sp>
         <p:nvSpPr>
-          <p:cNvPr id="125" name="Google Shape;125;p19"/>
+          <p:cNvPr id="130" name="Google Shape;130;p19"/>
           <p:cNvSpPr txBox="1"/>
           <p:nvPr>
             <p:ph idx="1" type="body"/>
@@ -10722,20 +11130,60 @@
                 <a:spcPts val="0"/>
               </a:spcBef>
               <a:spcAft>
+                <a:spcPts val="0"/>
+              </a:spcAft>
+              <a:buNone/>
+            </a:pPr>
+            <a:r>
+              <a:rPr lang="pt-BR" sz="2800"/>
+              <a:t>Mais completo por </a:t>
+            </a:r>
+            <a:r>
+              <a:rPr lang="pt-BR" sz="2800"/>
+              <a:t>padrão</a:t>
+            </a:r>
+            <a:r>
+              <a:rPr lang="pt-BR" sz="2800"/>
+              <a:t> que o React.</a:t>
+            </a:r>
+            <a:endParaRPr sz="2800"/>
+          </a:p>
+          <a:p>
+            <a:pPr indent="0" lvl="0" marL="0" rtl="0" algn="l">
+              <a:spcBef>
                 <a:spcPts val="1200"/>
+              </a:spcBef>
+              <a:spcAft>
+                <a:spcPts val="0"/>
               </a:spcAft>
               <a:buNone/>
             </a:pPr>
             <a:r>
               <a:t/>
             </a:r>
-            <a:endParaRPr/>
+            <a:endParaRPr sz="2800"/>
+          </a:p>
+          <a:p>
+            <a:pPr indent="0" lvl="0" marL="0" rtl="0" algn="l">
+              <a:spcBef>
+                <a:spcPts val="1200"/>
+              </a:spcBef>
+              <a:spcAft>
+                <a:spcPts val="1200"/>
+              </a:spcAft>
+              <a:buNone/>
+            </a:pPr>
+            <a:r>
+              <a:rPr lang="pt-BR" sz="2800"/>
+              <a:t>Typescript.</a:t>
+            </a:r>
+            <a:endParaRPr sz="2800"/>
           </a:p>
         </p:txBody>
       </p:sp>
       <p:pic>
         <p:nvPicPr>
-          <p:cNvPr id="126" name="Google Shape;126;p19"/>
+          <p:cNvPr id="131" name="Google Shape;131;p19"/>
           <p:cNvPicPr preferRelativeResize="0"/>
           <p:nvPr/>
         </p:nvPicPr>
@@ -10760,45 +11208,6 @@
           </a:ln>
         </p:spPr>
       </p:pic>
-      <p:sp>
-        <p:nvSpPr>
-          <p:cNvPr id="127" name="Google Shape;127;p19"/>
-          <p:cNvSpPr txBox="1"/>
-          <p:nvPr>
-            <p:ph idx="2" type="title"/>
-          </p:nvPr>
-        </p:nvSpPr>
-        <p:spPr>
-          <a:xfrm>
-            <a:off x="4757550" y="331475"/>
-            <a:ext cx="4200900" cy="873000"/>
-          </a:xfrm>
-          <a:prstGeom prst="rect">
-            <a:avLst/>
-          </a:prstGeom>
-        </p:spPr>
-        <p:txBody>
-          <a:bodyPr anchorCtr="0" anchor="t" bIns="91425" lIns="91425" spcFirstLastPara="1" rIns="91425" wrap="square" tIns="91425">
-            <a:normAutofit/>
-          </a:bodyPr>
-          <a:lstStyle/>
-          <a:p>
-            <a:pPr indent="0" lvl="0" marL="0" rtl="0" algn="l">
-              <a:spcBef>
-                <a:spcPts val="0"/>
-              </a:spcBef>
-              <a:spcAft>
-                <a:spcPts val="0"/>
-              </a:spcAft>
-              <a:buNone/>
-            </a:pPr>
-            <a:r>
-              <a:t/>
-            </a:r>
-            <a:endParaRPr/>
-          </a:p>
-        </p:txBody>
-      </p:sp>
     </p:spTree>
   </p:cSld>
   <p:clrMapOvr>
@@ -10812,7 +11221,7 @@
   <p:cSld>
     <p:spTree>
       <p:nvGrpSpPr>
-        <p:cNvPr id="131" name="Shape 131"/>
+        <p:cNvPr id="135" name="Shape 135"/>
         <p:cNvGrpSpPr/>
         <p:nvPr/>
       </p:nvGrpSpPr>
@@ -10826,7 +11235,7 @@
       </p:grpSpPr>
       <p:sp>
         <p:nvSpPr>
-          <p:cNvPr id="132" name="Google Shape;132;p20"/>
+          <p:cNvPr id="136" name="Google Shape;136;p20"/>
           <p:cNvSpPr txBox="1"/>
           <p:nvPr>
             <p:ph type="title"/>
@@ -10866,7 +11275,7 @@
       </p:sp>
       <p:sp>
         <p:nvSpPr>
-          <p:cNvPr id="133" name="Google Shape;133;p20"/>
+          <p:cNvPr id="137" name="Google Shape;137;p20"/>
           <p:cNvSpPr txBox="1"/>
           <p:nvPr>
             <p:ph idx="1" type="body"/>
@@ -10897,15 +11306,16 @@
               <a:buNone/>
             </a:pPr>
             <a:r>
-              <a:t/>
+              <a:rPr lang="pt-BR" sz="2800"/>
+              <a:t>Popularidade, mesmo que o yarn seja mais “performatico”.</a:t>
             </a:r>
-            <a:endParaRPr/>
+            <a:endParaRPr sz="2800"/>
           </a:p>
         </p:txBody>
       </p:sp>
       <p:pic>
         <p:nvPicPr>
-          <p:cNvPr id="134" name="Google Shape;134;p20"/>
+          <p:cNvPr id="138" name="Google Shape;138;p20"/>
           <p:cNvPicPr preferRelativeResize="0"/>
           <p:nvPr/>
         </p:nvPicPr>
@@ -10930,45 +11340,6 @@
           </a:ln>
         </p:spPr>
       </p:pic>
-      <p:sp>
-        <p:nvSpPr>
-          <p:cNvPr id="135" name="Google Shape;135;p20"/>
-          <p:cNvSpPr txBox="1"/>
-          <p:nvPr>
-            <p:ph idx="2" type="title"/>
-          </p:nvPr>
-        </p:nvSpPr>
-        <p:spPr>
-          <a:xfrm>
-            <a:off x="4757550" y="331475"/>
-            <a:ext cx="4200900" cy="873000"/>
-          </a:xfrm>
-          <a:prstGeom prst="rect">
-            <a:avLst/>
-          </a:prstGeom>
-        </p:spPr>
-        <p:txBody>
-          <a:bodyPr anchorCtr="0" anchor="t" bIns="91425" lIns="91425" spcFirstLastPara="1" rIns="91425" wrap="square" tIns="91425">
-            <a:normAutofit/>
-          </a:bodyPr>
-          <a:lstStyle/>
-          <a:p>
-            <a:pPr indent="0" lvl="0" marL="0" rtl="0" algn="l">
-              <a:spcBef>
-                <a:spcPts val="0"/>
-              </a:spcBef>
-              <a:spcAft>
-                <a:spcPts val="0"/>
-              </a:spcAft>
-              <a:buNone/>
-            </a:pPr>
-            <a:r>
-              <a:t/>
-            </a:r>
-            <a:endParaRPr/>
-          </a:p>
-        </p:txBody>
-      </p:sp>
     </p:spTree>
   </p:cSld>
   <p:clrMapOvr>
@@ -10982,7 +11353,7 @@
   <p:cSld>
     <p:spTree>
       <p:nvGrpSpPr>
-        <p:cNvPr id="139" name="Shape 139"/>
+        <p:cNvPr id="142" name="Shape 142"/>
         <p:cNvGrpSpPr/>
         <p:nvPr/>
       </p:nvGrpSpPr>
@@ -10996,7 +11367,7 @@
       </p:grpSpPr>
       <p:sp>
         <p:nvSpPr>
-          <p:cNvPr id="140" name="Google Shape;140;p21"/>
+          <p:cNvPr id="143" name="Google Shape;143;p21"/>
           <p:cNvSpPr txBox="1"/>
           <p:nvPr>
             <p:ph type="title"/>
@@ -11036,7 +11407,7 @@
       </p:sp>
       <p:sp>
         <p:nvSpPr>
-          <p:cNvPr id="141" name="Google Shape;141;p21"/>
+          <p:cNvPr id="144" name="Google Shape;144;p21"/>
           <p:cNvSpPr txBox="1"/>
           <p:nvPr>
             <p:ph idx="1" type="body"/>
@@ -11067,15 +11438,16 @@
               <a:buNone/>
             </a:pPr>
             <a:r>
-              <a:t/>
+              <a:rPr lang="pt-BR" sz="2800"/>
+              <a:t>Menor Complexidade.</a:t>
             </a:r>
-            <a:endParaRPr/>
+            <a:endParaRPr sz="2800"/>
           </a:p>
         </p:txBody>
       </p:sp>
       <p:pic>
         <p:nvPicPr>
-          <p:cNvPr id="142" name="Google Shape;142;p21"/>
+          <p:cNvPr id="145" name="Google Shape;145;p21"/>
           <p:cNvPicPr preferRelativeResize="0"/>
           <p:nvPr/>
         </p:nvPicPr>
@@ -11100,45 +11472,6 @@
           </a:ln>
         </p:spPr>
       </p:pic>
-      <p:sp>
-        <p:nvSpPr>
-          <p:cNvPr id="143" name="Google Shape;143;p21"/>
-          <p:cNvSpPr txBox="1"/>
-          <p:nvPr>
-            <p:ph idx="2" type="title"/>
-          </p:nvPr>
-        </p:nvSpPr>
-        <p:spPr>
-          <a:xfrm>
-            <a:off x="4757550" y="331475"/>
-            <a:ext cx="4200900" cy="873000"/>
-          </a:xfrm>
-          <a:prstGeom prst="rect">
-            <a:avLst/>
-          </a:prstGeom>
-        </p:spPr>
-        <p:txBody>
-          <a:bodyPr anchorCtr="0" anchor="t" bIns="91425" lIns="91425" spcFirstLastPara="1" rIns="91425" wrap="square" tIns="91425">
-            <a:normAutofit/>
-          </a:bodyPr>
-          <a:lstStyle/>
-          <a:p>
-            <a:pPr indent="0" lvl="0" marL="0" rtl="0" algn="l">
-              <a:spcBef>
-                <a:spcPts val="0"/>
-              </a:spcBef>
-              <a:spcAft>
-                <a:spcPts val="0"/>
-              </a:spcAft>
-              <a:buNone/>
-            </a:pPr>
-            <a:r>
-              <a:t/>
-            </a:r>
-            <a:endParaRPr/>
-          </a:p>
-        </p:txBody>
-      </p:sp>
     </p:spTree>
   </p:cSld>
   <p:clrMapOvr>

</xml_diff>